<commit_message>
uploaded correct presentation fix
</commit_message>
<xml_diff>
--- a/Painting Classification - Presentation.pptx
+++ b/Painting Classification - Presentation.pptx
@@ -5,10 +5,10 @@
     <p:sldMasterId id="2147483648" r:id="rId1"/>
   </p:sldMasterIdLst>
   <p:notesMasterIdLst>
-    <p:notesMasterId r:id="rId17"/>
+    <p:notesMasterId r:id="rId18"/>
   </p:notesMasterIdLst>
   <p:handoutMasterIdLst>
-    <p:handoutMasterId r:id="rId18"/>
+    <p:handoutMasterId r:id="rId19"/>
   </p:handoutMasterIdLst>
   <p:sldIdLst>
     <p:sldId id="261" r:id="rId2"/>
@@ -18,14 +18,15 @@
     <p:sldId id="273" r:id="rId6"/>
     <p:sldId id="262" r:id="rId7"/>
     <p:sldId id="274" r:id="rId8"/>
-    <p:sldId id="275" r:id="rId9"/>
-    <p:sldId id="277" r:id="rId10"/>
-    <p:sldId id="276" r:id="rId11"/>
-    <p:sldId id="278" r:id="rId12"/>
-    <p:sldId id="279" r:id="rId13"/>
-    <p:sldId id="280" r:id="rId14"/>
-    <p:sldId id="281" r:id="rId15"/>
-    <p:sldId id="282" r:id="rId16"/>
+    <p:sldId id="283" r:id="rId9"/>
+    <p:sldId id="275" r:id="rId10"/>
+    <p:sldId id="277" r:id="rId11"/>
+    <p:sldId id="276" r:id="rId12"/>
+    <p:sldId id="278" r:id="rId13"/>
+    <p:sldId id="279" r:id="rId14"/>
+    <p:sldId id="280" r:id="rId15"/>
+    <p:sldId id="281" r:id="rId16"/>
+    <p:sldId id="282" r:id="rId17"/>
   </p:sldIdLst>
   <p:sldSz cx="12192000" cy="6858000"/>
   <p:notesSz cx="6858000" cy="9144000"/>
@@ -230,7 +231,7 @@
             <a:pPr rtl="0"/>
             <a:fld id="{E668B800-9B94-4443-B4A4-68D7A84D942B}" type="datetime1">
               <a:rPr lang="el-GR" smtClean="0"/>
-              <a:t>13/2/2023</a:t>
+              <a:t>14/2/2023</a:t>
             </a:fld>
             <a:endParaRPr lang="el-GR" dirty="0"/>
           </a:p>
@@ -400,7 +401,7 @@
             <a:pPr rtl="0"/>
             <a:fld id="{D9EB575F-073D-4B72-9B93-74EB79A372BF}" type="datetime1">
               <a:rPr lang="el-GR" smtClean="0"/>
-              <a:t>13/2/2023</a:t>
+              <a:t>14/2/2023</a:t>
             </a:fld>
             <a:endParaRPr lang="el-GR" dirty="0"/>
           </a:p>
@@ -797,10 +798,9 @@
         </p:nvSpPr>
         <p:spPr/>
         <p:txBody>
-          <a:bodyPr rtlCol="0"/>
+          <a:bodyPr/>
           <a:lstStyle/>
           <a:p>
-            <a:pPr rtl="0"/>
             <a:endParaRPr lang="el-GR" dirty="0"/>
           </a:p>
         </p:txBody>
@@ -817,7 +817,7 @@
         </p:nvSpPr>
         <p:spPr/>
         <p:txBody>
-          <a:bodyPr rtlCol="0"/>
+          <a:bodyPr/>
           <a:lstStyle/>
           <a:p>
             <a:pPr rtl="0"/>
@@ -832,7 +832,7 @@
     </p:spTree>
     <p:extLst>
       <p:ext uri="{BB962C8B-B14F-4D97-AF65-F5344CB8AC3E}">
-        <p14:creationId xmlns:p14="http://schemas.microsoft.com/office/powerpoint/2010/main" val="1036980611"/>
+        <p14:creationId xmlns:p14="http://schemas.microsoft.com/office/powerpoint/2010/main" val="2354699353"/>
       </p:ext>
     </p:extLst>
   </p:cSld>
@@ -918,7 +918,7 @@
     </p:spTree>
     <p:extLst>
       <p:ext uri="{BB962C8B-B14F-4D97-AF65-F5344CB8AC3E}">
-        <p14:creationId xmlns:p14="http://schemas.microsoft.com/office/powerpoint/2010/main" val="3345435700"/>
+        <p14:creationId xmlns:p14="http://schemas.microsoft.com/office/powerpoint/2010/main" val="1036980611"/>
       </p:ext>
     </p:extLst>
   </p:cSld>
@@ -1004,7 +1004,7 @@
     </p:spTree>
     <p:extLst>
       <p:ext uri="{BB962C8B-B14F-4D97-AF65-F5344CB8AC3E}">
-        <p14:creationId xmlns:p14="http://schemas.microsoft.com/office/powerpoint/2010/main" val="3353298668"/>
+        <p14:creationId xmlns:p14="http://schemas.microsoft.com/office/powerpoint/2010/main" val="3345435700"/>
       </p:ext>
     </p:extLst>
   </p:cSld>
@@ -1090,7 +1090,7 @@
     </p:spTree>
     <p:extLst>
       <p:ext uri="{BB962C8B-B14F-4D97-AF65-F5344CB8AC3E}">
-        <p14:creationId xmlns:p14="http://schemas.microsoft.com/office/powerpoint/2010/main" val="105883497"/>
+        <p14:creationId xmlns:p14="http://schemas.microsoft.com/office/powerpoint/2010/main" val="3353298668"/>
       </p:ext>
     </p:extLst>
   </p:cSld>
@@ -1176,7 +1176,7 @@
     </p:spTree>
     <p:extLst>
       <p:ext uri="{BB962C8B-B14F-4D97-AF65-F5344CB8AC3E}">
-        <p14:creationId xmlns:p14="http://schemas.microsoft.com/office/powerpoint/2010/main" val="2957992043"/>
+        <p14:creationId xmlns:p14="http://schemas.microsoft.com/office/powerpoint/2010/main" val="105883497"/>
       </p:ext>
     </p:extLst>
   </p:cSld>
@@ -1254,6 +1254,92 @@
             <a:fld id="{82869989-EB00-4EE7-BCB5-25BDC5BB29F8}" type="slidenum">
               <a:rPr lang="el-GR" smtClean="0"/>
               <a:t>15</a:t>
+            </a:fld>
+            <a:endParaRPr lang="el-GR" dirty="0"/>
+          </a:p>
+        </p:txBody>
+      </p:sp>
+    </p:spTree>
+    <p:extLst>
+      <p:ext uri="{BB962C8B-B14F-4D97-AF65-F5344CB8AC3E}">
+        <p14:creationId xmlns:p14="http://schemas.microsoft.com/office/powerpoint/2010/main" val="2957992043"/>
+      </p:ext>
+    </p:extLst>
+  </p:cSld>
+  <p:clrMapOvr>
+    <a:masterClrMapping/>
+  </p:clrMapOvr>
+</p:notes>
+</file>
+
+<file path=ppt/notesSlides/notesSlide16.xml><?xml version="1.0" encoding="utf-8"?>
+<p:notes xmlns:a="http://schemas.openxmlformats.org/drawingml/2006/main" xmlns:r="http://schemas.openxmlformats.org/officeDocument/2006/relationships" xmlns:p="http://schemas.openxmlformats.org/presentationml/2006/main">
+  <p:cSld>
+    <p:spTree>
+      <p:nvGrpSpPr>
+        <p:cNvPr id="1" name=""/>
+        <p:cNvGrpSpPr/>
+        <p:nvPr/>
+      </p:nvGrpSpPr>
+      <p:grpSpPr>
+        <a:xfrm>
+          <a:off x="0" y="0"/>
+          <a:ext cx="0" cy="0"/>
+          <a:chOff x="0" y="0"/>
+          <a:chExt cx="0" cy="0"/>
+        </a:xfrm>
+      </p:grpSpPr>
+      <p:sp>
+        <p:nvSpPr>
+          <p:cNvPr id="2" name="Θέση εικόνας διαφάνειας 1"/>
+          <p:cNvSpPr>
+            <a:spLocks noGrp="1" noRot="1" noChangeAspect="1"/>
+          </p:cNvSpPr>
+          <p:nvPr>
+            <p:ph type="sldImg"/>
+          </p:nvPr>
+        </p:nvSpPr>
+        <p:spPr/>
+      </p:sp>
+      <p:sp>
+        <p:nvSpPr>
+          <p:cNvPr id="3" name="Θέση σημειώσεων 2"/>
+          <p:cNvSpPr>
+            <a:spLocks noGrp="1"/>
+          </p:cNvSpPr>
+          <p:nvPr>
+            <p:ph type="body" idx="1"/>
+          </p:nvPr>
+        </p:nvSpPr>
+        <p:spPr/>
+        <p:txBody>
+          <a:bodyPr rtlCol="0"/>
+          <a:lstStyle/>
+          <a:p>
+            <a:pPr rtl="0"/>
+            <a:endParaRPr lang="el-GR" dirty="0"/>
+          </a:p>
+        </p:txBody>
+      </p:sp>
+      <p:sp>
+        <p:nvSpPr>
+          <p:cNvPr id="4" name="Θέση αριθμού διαφάνειας 3"/>
+          <p:cNvSpPr>
+            <a:spLocks noGrp="1"/>
+          </p:cNvSpPr>
+          <p:nvPr>
+            <p:ph type="sldNum" sz="quarter" idx="10"/>
+          </p:nvPr>
+        </p:nvSpPr>
+        <p:spPr/>
+        <p:txBody>
+          <a:bodyPr rtlCol="0"/>
+          <a:lstStyle/>
+          <a:p>
+            <a:pPr rtl="0"/>
+            <a:fld id="{82869989-EB00-4EE7-BCB5-25BDC5BB29F8}" type="slidenum">
+              <a:rPr lang="el-GR" smtClean="0"/>
+              <a:t>16</a:t>
             </a:fld>
             <a:endParaRPr lang="el-GR" dirty="0"/>
           </a:p>
@@ -1827,10 +1913,9 @@
         </p:nvSpPr>
         <p:spPr/>
         <p:txBody>
-          <a:bodyPr rtlCol="0"/>
+          <a:bodyPr/>
           <a:lstStyle/>
           <a:p>
-            <a:pPr rtl="0"/>
             <a:endParaRPr lang="el-GR" dirty="0"/>
           </a:p>
         </p:txBody>
@@ -1847,7 +1932,7 @@
         </p:nvSpPr>
         <p:spPr/>
         <p:txBody>
-          <a:bodyPr rtlCol="0"/>
+          <a:bodyPr/>
           <a:lstStyle/>
           <a:p>
             <a:pPr rtl="0"/>
@@ -1862,7 +1947,7 @@
     </p:spTree>
     <p:extLst>
       <p:ext uri="{BB962C8B-B14F-4D97-AF65-F5344CB8AC3E}">
-        <p14:creationId xmlns:p14="http://schemas.microsoft.com/office/powerpoint/2010/main" val="2834882244"/>
+        <p14:creationId xmlns:p14="http://schemas.microsoft.com/office/powerpoint/2010/main" val="1300449782"/>
       </p:ext>
     </p:extLst>
   </p:cSld>
@@ -1913,9 +1998,10 @@
         </p:nvSpPr>
         <p:spPr/>
         <p:txBody>
-          <a:bodyPr/>
+          <a:bodyPr rtlCol="0"/>
           <a:lstStyle/>
           <a:p>
+            <a:pPr rtl="0"/>
             <a:endParaRPr lang="el-GR" dirty="0"/>
           </a:p>
         </p:txBody>
@@ -1932,7 +2018,7 @@
         </p:nvSpPr>
         <p:spPr/>
         <p:txBody>
-          <a:bodyPr/>
+          <a:bodyPr rtlCol="0"/>
           <a:lstStyle/>
           <a:p>
             <a:pPr rtl="0"/>
@@ -1947,7 +2033,7 @@
     </p:spTree>
     <p:extLst>
       <p:ext uri="{BB962C8B-B14F-4D97-AF65-F5344CB8AC3E}">
-        <p14:creationId xmlns:p14="http://schemas.microsoft.com/office/powerpoint/2010/main" val="2354699353"/>
+        <p14:creationId xmlns:p14="http://schemas.microsoft.com/office/powerpoint/2010/main" val="2834882244"/>
       </p:ext>
     </p:extLst>
   </p:cSld>
@@ -4103,7 +4189,7 @@
             <a:pPr rtl="0"/>
             <a:fld id="{419605DC-8E97-4700-8BB4-6BF2D5C3D2D2}" type="datetime1">
               <a:rPr lang="el-GR" smtClean="0"/>
-              <a:t>13/2/2023</a:t>
+              <a:t>14/2/2023</a:t>
             </a:fld>
             <a:endParaRPr lang="el-GR" dirty="0"/>
           </a:p>
@@ -4302,7 +4388,7 @@
             <a:pPr rtl="0"/>
             <a:fld id="{5F88804F-EC94-4EB7-A72E-4390969D5503}" type="datetime1">
               <a:rPr lang="el-GR" smtClean="0"/>
-              <a:t>13/2/2023</a:t>
+              <a:t>14/2/2023</a:t>
             </a:fld>
             <a:endParaRPr lang="el-GR" dirty="0"/>
           </a:p>
@@ -4489,7 +4575,7 @@
             <a:pPr rtl="0"/>
             <a:fld id="{61BA2533-B78C-4319-9668-E8781A1B6EA1}" type="datetime1">
               <a:rPr lang="el-GR" smtClean="0"/>
-              <a:t>13/2/2023</a:t>
+              <a:t>14/2/2023</a:t>
             </a:fld>
             <a:endParaRPr lang="el-GR" dirty="0"/>
           </a:p>
@@ -6814,7 +6900,7 @@
             <a:pPr rtl="0"/>
             <a:fld id="{5245A5E0-1A0E-4CAC-A5F3-B68AA6966061}" type="datetime1">
               <a:rPr lang="el-GR" smtClean="0"/>
-              <a:t>13/2/2023</a:t>
+              <a:t>14/2/2023</a:t>
             </a:fld>
             <a:endParaRPr lang="el-GR" dirty="0"/>
           </a:p>
@@ -7271,7 +7357,7 @@
             <a:pPr rtl="0"/>
             <a:fld id="{5FF74989-93D9-4BE5-98E5-F0832F15830C}" type="datetime1">
               <a:rPr lang="el-GR" smtClean="0"/>
-              <a:t>13/2/2023</a:t>
+              <a:t>14/2/2023</a:t>
             </a:fld>
             <a:endParaRPr lang="el-GR" dirty="0"/>
           </a:p>
@@ -7407,7 +7493,7 @@
             <a:pPr rtl="0"/>
             <a:fld id="{3C7E94CE-FC02-466C-8703-0695B282E26C}" type="datetime1">
               <a:rPr lang="el-GR" smtClean="0"/>
-              <a:t>13/2/2023</a:t>
+              <a:t>14/2/2023</a:t>
             </a:fld>
             <a:endParaRPr lang="el-GR" dirty="0"/>
           </a:p>
@@ -9343,7 +9429,7 @@
             <a:pPr rtl="0"/>
             <a:fld id="{499F72B0-28A3-4A40-B61E-EDF16353235B}" type="datetime1">
               <a:rPr lang="el-GR" smtClean="0"/>
-              <a:t>13/2/2023</a:t>
+              <a:t>14/2/2023</a:t>
             </a:fld>
             <a:endParaRPr lang="el-GR" dirty="0"/>
           </a:p>
@@ -11583,7 +11669,7 @@
             <a:pPr rtl="0"/>
             <a:fld id="{10C3B3A4-D53F-421B-9BAB-9DD5DF8FC9D0}" type="datetime1">
               <a:rPr lang="el-GR" smtClean="0"/>
-              <a:t>13/2/2023</a:t>
+              <a:t>14/2/2023</a:t>
             </a:fld>
             <a:endParaRPr lang="el-GR" dirty="0"/>
           </a:p>
@@ -15860,7 +15946,7 @@
             <a:pPr rtl="0"/>
             <a:fld id="{9B46EC52-5824-4DE4-A8EE-A139C795D6DB}" type="datetime1">
               <a:rPr lang="el-GR" smtClean="0"/>
-              <a:t>13/2/2023</a:t>
+              <a:t>14/2/2023</a:t>
             </a:fld>
             <a:endParaRPr lang="el-GR" dirty="0"/>
           </a:p>
@@ -16405,6 +16491,172 @@
           <a:chExt cx="0" cy="0"/>
         </a:xfrm>
       </p:grpSpPr>
+      <p:sp>
+        <p:nvSpPr>
+          <p:cNvPr id="2" name="Τίτλος 1"/>
+          <p:cNvSpPr>
+            <a:spLocks noGrp="1"/>
+          </p:cNvSpPr>
+          <p:nvPr>
+            <p:ph type="title"/>
+          </p:nvPr>
+        </p:nvSpPr>
+        <p:spPr>
+          <a:xfrm>
+            <a:off x="1295400" y="503853"/>
+            <a:ext cx="9601200" cy="674707"/>
+          </a:xfrm>
+        </p:spPr>
+        <p:txBody>
+          <a:bodyPr rtlCol="0"/>
+          <a:lstStyle/>
+          <a:p>
+            <a:pPr rtl="0"/>
+            <a:r>
+              <a:rPr lang="el-GR" dirty="0" err="1"/>
+              <a:t>Οπτικοποίηση</a:t>
+            </a:r>
+            <a:r>
+              <a:rPr lang="el-GR" dirty="0"/>
+              <a:t> του </a:t>
+            </a:r>
+            <a:r>
+              <a:rPr lang="en-US" dirty="0"/>
+              <a:t>dataset</a:t>
+            </a:r>
+            <a:endParaRPr lang="el-GR" dirty="0"/>
+          </a:p>
+        </p:txBody>
+      </p:sp>
+      <p:sp>
+        <p:nvSpPr>
+          <p:cNvPr id="4" name="Θέση περιεχομένου 3">
+            <a:extLst>
+              <a:ext uri="{FF2B5EF4-FFF2-40B4-BE49-F238E27FC236}">
+                <a16:creationId xmlns:a16="http://schemas.microsoft.com/office/drawing/2014/main" id="{8733A4D4-0156-8DCA-778A-333964D45020}"/>
+              </a:ext>
+            </a:extLst>
+          </p:cNvPr>
+          <p:cNvSpPr>
+            <a:spLocks noGrp="1"/>
+          </p:cNvSpPr>
+          <p:nvPr>
+            <p:ph idx="1"/>
+          </p:nvPr>
+        </p:nvSpPr>
+        <p:spPr>
+          <a:xfrm>
+            <a:off x="1295400" y="1524001"/>
+            <a:ext cx="9601200" cy="674703"/>
+          </a:xfrm>
+        </p:spPr>
+        <p:txBody>
+          <a:bodyPr/>
+          <a:lstStyle/>
+          <a:p>
+            <a:r>
+              <a:rPr lang="el-GR" dirty="0"/>
+              <a:t>Χρησιμοποιήσαμε την τεχνική </a:t>
+            </a:r>
+            <a:r>
+              <a:rPr lang="en-US" dirty="0"/>
+              <a:t>PCA </a:t>
+            </a:r>
+            <a:r>
+              <a:rPr lang="el-GR" dirty="0"/>
+              <a:t>για να μειώσουμε τις διαστάσεις του </a:t>
+            </a:r>
+            <a:r>
+              <a:rPr lang="en-US" dirty="0"/>
+              <a:t>dataset </a:t>
+            </a:r>
+            <a:r>
+              <a:rPr lang="el-GR" dirty="0"/>
+              <a:t>σε 3</a:t>
+            </a:r>
+            <a:r>
+              <a:rPr lang="en-US" dirty="0"/>
+              <a:t> </a:t>
+            </a:r>
+            <a:r>
+              <a:rPr lang="el-GR" dirty="0"/>
+              <a:t>και να πάρουμε μία εικόνα:</a:t>
+            </a:r>
+          </a:p>
+        </p:txBody>
+      </p:sp>
+      <p:pic>
+        <p:nvPicPr>
+          <p:cNvPr id="5" name="Εικόνα 4">
+            <a:extLst>
+              <a:ext uri="{FF2B5EF4-FFF2-40B4-BE49-F238E27FC236}">
+                <a16:creationId xmlns:a16="http://schemas.microsoft.com/office/drawing/2014/main" id="{DDCC4542-3B03-F0F4-7B0C-BBFC27D9ED1C}"/>
+              </a:ext>
+            </a:extLst>
+          </p:cNvPr>
+          <p:cNvPicPr>
+            <a:picLocks noChangeAspect="1"/>
+          </p:cNvPicPr>
+          <p:nvPr/>
+        </p:nvPicPr>
+        <p:blipFill>
+          <a:blip r:embed="rId3"/>
+          <a:stretch>
+            <a:fillRect/>
+          </a:stretch>
+        </p:blipFill>
+        <p:spPr>
+          <a:xfrm>
+            <a:off x="1628775" y="2357967"/>
+            <a:ext cx="8934450" cy="3429000"/>
+          </a:xfrm>
+          <a:prstGeom prst="rect">
+            <a:avLst/>
+          </a:prstGeom>
+        </p:spPr>
+      </p:pic>
+    </p:spTree>
+    <p:extLst>
+      <p:ext uri="{BB962C8B-B14F-4D97-AF65-F5344CB8AC3E}">
+        <p14:creationId xmlns:p14="http://schemas.microsoft.com/office/powerpoint/2010/main" val="2635910489"/>
+      </p:ext>
+    </p:extLst>
+  </p:cSld>
+  <p:clrMapOvr>
+    <a:masterClrMapping/>
+  </p:clrMapOvr>
+  <mc:AlternateContent xmlns:mc="http://schemas.openxmlformats.org/markup-compatibility/2006" xmlns:p14="http://schemas.microsoft.com/office/powerpoint/2010/main">
+    <mc:Choice Requires="p14">
+      <p:transition spd="med" p14:dur="700">
+        <p:fade/>
+      </p:transition>
+    </mc:Choice>
+    <mc:Fallback xmlns="">
+      <p:transition spd="med">
+        <p:fade/>
+      </p:transition>
+    </mc:Fallback>
+  </mc:AlternateContent>
+</p:sld>
+</file>
+
+<file path=ppt/slides/slide11.xml><?xml version="1.0" encoding="utf-8"?>
+<p:sld xmlns:a="http://schemas.openxmlformats.org/drawingml/2006/main" xmlns:r="http://schemas.openxmlformats.org/officeDocument/2006/relationships" xmlns:p="http://schemas.openxmlformats.org/presentationml/2006/main">
+  <p:cSld>
+    <p:spTree>
+      <p:nvGrpSpPr>
+        <p:cNvPr id="1" name=""/>
+        <p:cNvGrpSpPr/>
+        <p:nvPr/>
+      </p:nvGrpSpPr>
+      <p:grpSpPr>
+        <a:xfrm>
+          <a:off x="0" y="0"/>
+          <a:ext cx="0" cy="0"/>
+          <a:chOff x="0" y="0"/>
+          <a:chExt cx="0" cy="0"/>
+        </a:xfrm>
+      </p:grpSpPr>
       <p:pic>
         <p:nvPicPr>
           <p:cNvPr id="8" name="Εικόνα 7">
@@ -16816,7 +17068,7 @@
 </p:sld>
 </file>
 
-<file path=ppt/slides/slide11.xml><?xml version="1.0" encoding="utf-8"?>
+<file path=ppt/slides/slide12.xml><?xml version="1.0" encoding="utf-8"?>
 <p:sld xmlns:a="http://schemas.openxmlformats.org/drawingml/2006/main" xmlns:r="http://schemas.openxmlformats.org/officeDocument/2006/relationships" xmlns:p="http://schemas.openxmlformats.org/presentationml/2006/main">
   <p:cSld>
     <p:spTree>
@@ -17244,7 +17496,7 @@
 </p:sld>
 </file>
 
-<file path=ppt/slides/slide12.xml><?xml version="1.0" encoding="utf-8"?>
+<file path=ppt/slides/slide13.xml><?xml version="1.0" encoding="utf-8"?>
 <p:sld xmlns:a="http://schemas.openxmlformats.org/drawingml/2006/main" xmlns:r="http://schemas.openxmlformats.org/officeDocument/2006/relationships" xmlns:p="http://schemas.openxmlformats.org/presentationml/2006/main">
   <p:cSld>
     <p:spTree>
@@ -17817,7 +18069,7 @@
 </p:sld>
 </file>
 
-<file path=ppt/slides/slide13.xml><?xml version="1.0" encoding="utf-8"?>
+<file path=ppt/slides/slide14.xml><?xml version="1.0" encoding="utf-8"?>
 <p:sld xmlns:a="http://schemas.openxmlformats.org/drawingml/2006/main" xmlns:r="http://schemas.openxmlformats.org/officeDocument/2006/relationships" xmlns:p="http://schemas.openxmlformats.org/presentationml/2006/main">
   <p:cSld>
     <p:spTree>
@@ -18157,7 +18409,7 @@
             </a:r>
             <a:r>
               <a:rPr lang="el-GR" dirty="0"/>
-              <a:t>, τα οποία δεν τα είχε δει ποτέ, η ακρίβεια αρκετά κοντά με αυτή που υπολογίσαμε στο </a:t>
+              <a:t>, τα οποία δεν τα είχε δει ποτέ, η ακρίβεια ήταν αρκετά κοντά με αυτή που υπολογίσαμε στο </a:t>
             </a:r>
             <a:r>
               <a:rPr lang="en-US" dirty="0"/>
@@ -18333,7 +18585,7 @@
 </p:sld>
 </file>
 
-<file path=ppt/slides/slide14.xml><?xml version="1.0" encoding="utf-8"?>
+<file path=ppt/slides/slide15.xml><?xml version="1.0" encoding="utf-8"?>
 <p:sld xmlns:a="http://schemas.openxmlformats.org/drawingml/2006/main" xmlns:r="http://schemas.openxmlformats.org/officeDocument/2006/relationships" xmlns:p="http://schemas.openxmlformats.org/presentationml/2006/main">
   <p:cSld>
     <p:spTree>
@@ -18834,7 +19086,7 @@
 </p:sld>
 </file>
 
-<file path=ppt/slides/slide15.xml><?xml version="1.0" encoding="utf-8"?>
+<file path=ppt/slides/slide16.xml><?xml version="1.0" encoding="utf-8"?>
 <p:sld xmlns:a="http://schemas.openxmlformats.org/drawingml/2006/main" xmlns:r="http://schemas.openxmlformats.org/officeDocument/2006/relationships" xmlns:p="http://schemas.openxmlformats.org/presentationml/2006/main">
   <p:cSld>
     <p:spTree>
@@ -20125,8 +20377,8 @@
           </a:fontRef>
         </p:style>
       </p:cxnSp>
-      <mc:AlternateContent xmlns:mc="http://schemas.openxmlformats.org/markup-compatibility/2006">
-        <mc:Choice xmlns:a14="http://schemas.microsoft.com/office/drawing/2010/main" Requires="a14">
+      <mc:AlternateContent xmlns:mc="http://schemas.openxmlformats.org/markup-compatibility/2006" xmlns:a14="http://schemas.microsoft.com/office/drawing/2010/main">
+        <mc:Choice Requires="a14">
           <p:sp>
             <p:nvSpPr>
               <p:cNvPr id="13" name="TextBox 12">
@@ -20155,6 +20407,7 @@
               </a:bodyPr>
               <a:lstStyle/>
               <a:p>
+                <a:pPr/>
                 <a14:m>
                   <m:oMathPara xmlns:m="http://schemas.openxmlformats.org/officeDocument/2006/math">
                     <m:oMathParaPr>
@@ -20517,7 +20770,7 @@
             </p:txBody>
           </p:sp>
         </mc:Choice>
-        <mc:Fallback>
+        <mc:Fallback xmlns="">
           <p:sp>
             <p:nvSpPr>
               <p:cNvPr id="13" name="TextBox 12">
@@ -20893,6 +21146,232 @@
 </file>
 
 <file path=ppt/slides/slide8.xml><?xml version="1.0" encoding="utf-8"?>
+<p:sld xmlns:a="http://schemas.openxmlformats.org/drawingml/2006/main" xmlns:r="http://schemas.openxmlformats.org/officeDocument/2006/relationships" xmlns:p="http://schemas.openxmlformats.org/presentationml/2006/main">
+  <p:cSld>
+    <p:spTree>
+      <p:nvGrpSpPr>
+        <p:cNvPr id="1" name=""/>
+        <p:cNvGrpSpPr/>
+        <p:nvPr/>
+      </p:nvGrpSpPr>
+      <p:grpSpPr>
+        <a:xfrm>
+          <a:off x="0" y="0"/>
+          <a:ext cx="0" cy="0"/>
+          <a:chOff x="0" y="0"/>
+          <a:chExt cx="0" cy="0"/>
+        </a:xfrm>
+      </p:grpSpPr>
+      <p:pic>
+        <p:nvPicPr>
+          <p:cNvPr id="6" name="Εικόνα 5">
+            <a:extLst>
+              <a:ext uri="{FF2B5EF4-FFF2-40B4-BE49-F238E27FC236}">
+                <a16:creationId xmlns:a16="http://schemas.microsoft.com/office/drawing/2014/main" id="{EDFF492A-C43D-D8C9-28EF-171009AAD08F}"/>
+              </a:ext>
+            </a:extLst>
+          </p:cNvPr>
+          <p:cNvPicPr>
+            <a:picLocks noChangeAspect="1"/>
+          </p:cNvPicPr>
+          <p:nvPr/>
+        </p:nvPicPr>
+        <p:blipFill>
+          <a:blip r:embed="rId3"/>
+          <a:stretch>
+            <a:fillRect/>
+          </a:stretch>
+        </p:blipFill>
+        <p:spPr>
+          <a:xfrm>
+            <a:off x="407980" y="2158067"/>
+            <a:ext cx="11376040" cy="4196080"/>
+          </a:xfrm>
+          <a:prstGeom prst="rect">
+            <a:avLst/>
+          </a:prstGeom>
+        </p:spPr>
+      </p:pic>
+      <p:pic>
+        <p:nvPicPr>
+          <p:cNvPr id="5" name="Εικόνα 4">
+            <a:extLst>
+              <a:ext uri="{FF2B5EF4-FFF2-40B4-BE49-F238E27FC236}">
+                <a16:creationId xmlns:a16="http://schemas.microsoft.com/office/drawing/2014/main" id="{0D4DCF35-5F02-604F-0CAE-AA68570EED40}"/>
+              </a:ext>
+            </a:extLst>
+          </p:cNvPr>
+          <p:cNvPicPr>
+            <a:picLocks noChangeAspect="1"/>
+          </p:cNvPicPr>
+          <p:nvPr/>
+        </p:nvPicPr>
+        <p:blipFill>
+          <a:blip r:embed="rId3"/>
+          <a:stretch>
+            <a:fillRect/>
+          </a:stretch>
+        </p:blipFill>
+        <p:spPr>
+          <a:xfrm>
+            <a:off x="407980" y="1930400"/>
+            <a:ext cx="11376040" cy="4196080"/>
+          </a:xfrm>
+          <a:prstGeom prst="rect">
+            <a:avLst/>
+          </a:prstGeom>
+        </p:spPr>
+      </p:pic>
+      <p:sp>
+        <p:nvSpPr>
+          <p:cNvPr id="2" name="Τίτλος 1"/>
+          <p:cNvSpPr>
+            <a:spLocks noGrp="1"/>
+          </p:cNvSpPr>
+          <p:nvPr>
+            <p:ph type="title"/>
+          </p:nvPr>
+        </p:nvSpPr>
+        <p:spPr>
+          <a:xfrm>
+            <a:off x="1295400" y="503853"/>
+            <a:ext cx="9601200" cy="674707"/>
+          </a:xfrm>
+        </p:spPr>
+        <p:txBody>
+          <a:bodyPr rtlCol="0"/>
+          <a:lstStyle/>
+          <a:p>
+            <a:pPr rtl="0"/>
+            <a:r>
+              <a:rPr lang="en-US" dirty="0"/>
+              <a:t>Feature Selection</a:t>
+            </a:r>
+            <a:endParaRPr lang="el-GR" dirty="0"/>
+          </a:p>
+        </p:txBody>
+      </p:sp>
+      <p:sp>
+        <p:nvSpPr>
+          <p:cNvPr id="4" name="Θέση περιεχομένου 3">
+            <a:extLst>
+              <a:ext uri="{FF2B5EF4-FFF2-40B4-BE49-F238E27FC236}">
+                <a16:creationId xmlns:a16="http://schemas.microsoft.com/office/drawing/2014/main" id="{8733A4D4-0156-8DCA-778A-333964D45020}"/>
+              </a:ext>
+            </a:extLst>
+          </p:cNvPr>
+          <p:cNvSpPr>
+            <a:spLocks noGrp="1"/>
+          </p:cNvSpPr>
+          <p:nvPr>
+            <p:ph idx="1"/>
+          </p:nvPr>
+        </p:nvSpPr>
+        <p:spPr>
+          <a:xfrm>
+            <a:off x="1295400" y="1524001"/>
+            <a:ext cx="9601200" cy="1534160"/>
+          </a:xfrm>
+        </p:spPr>
+        <p:txBody>
+          <a:bodyPr>
+            <a:normAutofit/>
+          </a:bodyPr>
+          <a:lstStyle/>
+          <a:p>
+            <a:r>
+              <a:rPr lang="el-GR" dirty="0"/>
+              <a:t>Δοκιμάσαμε μία μέθοδο </a:t>
+            </a:r>
+            <a:r>
+              <a:rPr lang="en-US" dirty="0" err="1"/>
+              <a:t>SelectKBest</a:t>
+            </a:r>
+            <a:r>
+              <a:rPr lang="en-US" dirty="0"/>
+              <a:t> </a:t>
+            </a:r>
+            <a:r>
+              <a:rPr lang="el-GR" dirty="0"/>
+              <a:t>για τον υπολογισμό των βέλτιστων </a:t>
+            </a:r>
+            <a:r>
+              <a:rPr lang="en-US" dirty="0"/>
+              <a:t>features</a:t>
+            </a:r>
+          </a:p>
+          <a:p>
+            <a:r>
+              <a:rPr lang="el-GR" dirty="0"/>
+              <a:t>Όλα τα </a:t>
+            </a:r>
+            <a:r>
+              <a:rPr lang="en-US" dirty="0"/>
+              <a:t>features </a:t>
+            </a:r>
+            <a:r>
+              <a:rPr lang="el-GR" dirty="0"/>
+              <a:t>ομαδοποιήθηκαν σε ένα </a:t>
+            </a:r>
+            <a:r>
+              <a:rPr lang="en-US" dirty="0"/>
+              <a:t>feature vector </a:t>
+            </a:r>
+            <a:r>
+              <a:rPr lang="el-GR" dirty="0"/>
+              <a:t>με διάσταση 64</a:t>
+            </a:r>
+            <a:r>
+              <a:rPr lang="en-US" dirty="0"/>
+              <a:t>x64 x 5 + 3800 = 24280 </a:t>
+            </a:r>
+            <a:r>
+              <a:rPr lang="el-GR" dirty="0"/>
+              <a:t>στήλες</a:t>
+            </a:r>
+            <a:r>
+              <a:rPr lang="en-US" dirty="0"/>
+              <a:t>	</a:t>
+            </a:r>
+            <a:endParaRPr lang="el-GR" dirty="0"/>
+          </a:p>
+          <a:p>
+            <a:endParaRPr lang="en-US" dirty="0"/>
+          </a:p>
+          <a:p>
+            <a:pPr marL="0" indent="0">
+              <a:buNone/>
+            </a:pPr>
+            <a:endParaRPr lang="el-GR" dirty="0"/>
+          </a:p>
+        </p:txBody>
+      </p:sp>
+    </p:spTree>
+    <p:extLst>
+      <p:ext uri="{BB962C8B-B14F-4D97-AF65-F5344CB8AC3E}">
+        <p14:creationId xmlns:p14="http://schemas.microsoft.com/office/powerpoint/2010/main" val="3618589653"/>
+      </p:ext>
+    </p:extLst>
+  </p:cSld>
+  <p:clrMapOvr>
+    <a:masterClrMapping/>
+  </p:clrMapOvr>
+  <mc:AlternateContent xmlns:mc="http://schemas.openxmlformats.org/markup-compatibility/2006" xmlns:p14="http://schemas.microsoft.com/office/powerpoint/2010/main">
+    <mc:Choice Requires="p14">
+      <p:transition spd="med" p14:dur="700">
+        <p:fade/>
+      </p:transition>
+    </mc:Choice>
+    <mc:Fallback xmlns="">
+      <p:transition spd="med">
+        <p:fade/>
+      </p:transition>
+    </mc:Fallback>
+  </mc:AlternateContent>
+</p:sld>
+</file>
+
+<file path=ppt/slides/slide9.xml><?xml version="1.0" encoding="utf-8"?>
 <p:sld xmlns:a="http://schemas.openxmlformats.org/drawingml/2006/main" xmlns:r="http://schemas.openxmlformats.org/officeDocument/2006/relationships" xmlns:p="http://schemas.openxmlformats.org/presentationml/2006/main">
   <p:cSld>
     <p:spTree>
@@ -21374,172 +21853,6 @@
     <p:extLst>
       <p:ext uri="{BB962C8B-B14F-4D97-AF65-F5344CB8AC3E}">
         <p14:creationId xmlns:p14="http://schemas.microsoft.com/office/powerpoint/2010/main" val="1907126397"/>
-      </p:ext>
-    </p:extLst>
-  </p:cSld>
-  <p:clrMapOvr>
-    <a:masterClrMapping/>
-  </p:clrMapOvr>
-  <mc:AlternateContent xmlns:mc="http://schemas.openxmlformats.org/markup-compatibility/2006" xmlns:p14="http://schemas.microsoft.com/office/powerpoint/2010/main">
-    <mc:Choice Requires="p14">
-      <p:transition spd="med" p14:dur="700">
-        <p:fade/>
-      </p:transition>
-    </mc:Choice>
-    <mc:Fallback xmlns="">
-      <p:transition spd="med">
-        <p:fade/>
-      </p:transition>
-    </mc:Fallback>
-  </mc:AlternateContent>
-</p:sld>
-</file>
-
-<file path=ppt/slides/slide9.xml><?xml version="1.0" encoding="utf-8"?>
-<p:sld xmlns:a="http://schemas.openxmlformats.org/drawingml/2006/main" xmlns:r="http://schemas.openxmlformats.org/officeDocument/2006/relationships" xmlns:p="http://schemas.openxmlformats.org/presentationml/2006/main">
-  <p:cSld>
-    <p:spTree>
-      <p:nvGrpSpPr>
-        <p:cNvPr id="1" name=""/>
-        <p:cNvGrpSpPr/>
-        <p:nvPr/>
-      </p:nvGrpSpPr>
-      <p:grpSpPr>
-        <a:xfrm>
-          <a:off x="0" y="0"/>
-          <a:ext cx="0" cy="0"/>
-          <a:chOff x="0" y="0"/>
-          <a:chExt cx="0" cy="0"/>
-        </a:xfrm>
-      </p:grpSpPr>
-      <p:sp>
-        <p:nvSpPr>
-          <p:cNvPr id="2" name="Τίτλος 1"/>
-          <p:cNvSpPr>
-            <a:spLocks noGrp="1"/>
-          </p:cNvSpPr>
-          <p:nvPr>
-            <p:ph type="title"/>
-          </p:nvPr>
-        </p:nvSpPr>
-        <p:spPr>
-          <a:xfrm>
-            <a:off x="1295400" y="503853"/>
-            <a:ext cx="9601200" cy="674707"/>
-          </a:xfrm>
-        </p:spPr>
-        <p:txBody>
-          <a:bodyPr rtlCol="0"/>
-          <a:lstStyle/>
-          <a:p>
-            <a:pPr rtl="0"/>
-            <a:r>
-              <a:rPr lang="el-GR" dirty="0" err="1"/>
-              <a:t>Οπτικοποίηση</a:t>
-            </a:r>
-            <a:r>
-              <a:rPr lang="el-GR" dirty="0"/>
-              <a:t> του </a:t>
-            </a:r>
-            <a:r>
-              <a:rPr lang="en-US" dirty="0"/>
-              <a:t>dataset</a:t>
-            </a:r>
-            <a:endParaRPr lang="el-GR" dirty="0"/>
-          </a:p>
-        </p:txBody>
-      </p:sp>
-      <p:sp>
-        <p:nvSpPr>
-          <p:cNvPr id="4" name="Θέση περιεχομένου 3">
-            <a:extLst>
-              <a:ext uri="{FF2B5EF4-FFF2-40B4-BE49-F238E27FC236}">
-                <a16:creationId xmlns:a16="http://schemas.microsoft.com/office/drawing/2014/main" id="{8733A4D4-0156-8DCA-778A-333964D45020}"/>
-              </a:ext>
-            </a:extLst>
-          </p:cNvPr>
-          <p:cNvSpPr>
-            <a:spLocks noGrp="1"/>
-          </p:cNvSpPr>
-          <p:nvPr>
-            <p:ph idx="1"/>
-          </p:nvPr>
-        </p:nvSpPr>
-        <p:spPr>
-          <a:xfrm>
-            <a:off x="1295400" y="1524001"/>
-            <a:ext cx="9601200" cy="674703"/>
-          </a:xfrm>
-        </p:spPr>
-        <p:txBody>
-          <a:bodyPr/>
-          <a:lstStyle/>
-          <a:p>
-            <a:r>
-              <a:rPr lang="el-GR" dirty="0"/>
-              <a:t>Χρησιμοποιήσαμε την τεχνική </a:t>
-            </a:r>
-            <a:r>
-              <a:rPr lang="en-US" dirty="0"/>
-              <a:t>PCA </a:t>
-            </a:r>
-            <a:r>
-              <a:rPr lang="el-GR" dirty="0"/>
-              <a:t>για να μειώσουμε τις διαστάσεις του </a:t>
-            </a:r>
-            <a:r>
-              <a:rPr lang="en-US" dirty="0"/>
-              <a:t>dataset </a:t>
-            </a:r>
-            <a:r>
-              <a:rPr lang="el-GR" dirty="0"/>
-              <a:t>σε 3</a:t>
-            </a:r>
-            <a:r>
-              <a:rPr lang="en-US" dirty="0"/>
-              <a:t> </a:t>
-            </a:r>
-            <a:r>
-              <a:rPr lang="el-GR" dirty="0"/>
-              <a:t>και να πάρουμε μία εικόνα:</a:t>
-            </a:r>
-          </a:p>
-        </p:txBody>
-      </p:sp>
-      <p:pic>
-        <p:nvPicPr>
-          <p:cNvPr id="5" name="Εικόνα 4">
-            <a:extLst>
-              <a:ext uri="{FF2B5EF4-FFF2-40B4-BE49-F238E27FC236}">
-                <a16:creationId xmlns:a16="http://schemas.microsoft.com/office/drawing/2014/main" id="{DDCC4542-3B03-F0F4-7B0C-BBFC27D9ED1C}"/>
-              </a:ext>
-            </a:extLst>
-          </p:cNvPr>
-          <p:cNvPicPr>
-            <a:picLocks noChangeAspect="1"/>
-          </p:cNvPicPr>
-          <p:nvPr/>
-        </p:nvPicPr>
-        <p:blipFill>
-          <a:blip r:embed="rId3"/>
-          <a:stretch>
-            <a:fillRect/>
-          </a:stretch>
-        </p:blipFill>
-        <p:spPr>
-          <a:xfrm>
-            <a:off x="1628775" y="2357967"/>
-            <a:ext cx="8934450" cy="3429000"/>
-          </a:xfrm>
-          <a:prstGeom prst="rect">
-            <a:avLst/>
-          </a:prstGeom>
-        </p:spPr>
-      </p:pic>
-    </p:spTree>
-    <p:extLst>
-      <p:ext uri="{BB962C8B-B14F-4D97-AF65-F5344CB8AC3E}">
-        <p14:creationId xmlns:p14="http://schemas.microsoft.com/office/powerpoint/2010/main" val="2635910489"/>
       </p:ext>
     </p:extLst>
   </p:cSld>

</xml_diff>